<commit_message>
Upload latest version of ppt
</commit_message>
<xml_diff>
--- a/skynet.pptx
+++ b/skynet.pptx
@@ -12,14 +12,9 @@
     <p:sldId id="260" r:id="rId6"/>
     <p:sldId id="263" r:id="rId7"/>
     <p:sldId id="264" r:id="rId8"/>
-    <p:sldId id="266" r:id="rId9"/>
-    <p:sldId id="265" r:id="rId10"/>
+    <p:sldId id="265" r:id="rId9"/>
+    <p:sldId id="272" r:id="rId10"/>
     <p:sldId id="262" r:id="rId11"/>
-    <p:sldId id="268" r:id="rId12"/>
-    <p:sldId id="267" r:id="rId13"/>
-    <p:sldId id="269" r:id="rId14"/>
-    <p:sldId id="270" r:id="rId15"/>
-    <p:sldId id="271" r:id="rId16"/>
   </p:sldIdLst>
   <p:sldSz cx="12192000" cy="6858000"/>
   <p:notesSz cx="6858000" cy="9144000"/>
@@ -13802,7 +13797,7 @@
                 <a16:creationId xmlns:a16="http://schemas.microsoft.com/office/drawing/2014/main" id="{E2CFBC99-FB8F-41F7-A81D-A5288D688D79}"/>
               </a:ext>
               <a:ext uri="{C183D7F6-B498-43B3-948B-1728B52AA6E4}">
-                <adec:decorative xmlns:adec="http://schemas.microsoft.com/office/drawing/2017/decorative" val="1"/>
+                <adec:decorative xmlns:adec="http://schemas.microsoft.com/office/drawing/2017/decorative" xmlns="" val="1"/>
               </a:ext>
             </a:extLst>
           </p:cNvPr>
@@ -14438,6 +14433,13 @@
   <p:clrMapOvr>
     <a:overrideClrMapping bg1="dk1" tx1="lt1" bg2="dk2" tx2="lt2" accent1="accent1" accent2="accent2" accent3="accent3" accent4="accent4" accent5="accent5" accent6="accent6" hlink="hlink" folHlink="folHlink"/>
   </p:clrMapOvr>
+  <p:timing>
+    <p:tnLst>
+      <p:par>
+        <p:cTn id="1" dur="indefinite" restart="never" nodeType="tmRoot"/>
+      </p:par>
+    </p:tnLst>
+  </p:timing>
 </p:sld>
 </file>
 
@@ -14480,9 +14482,10 @@
           <a:lstStyle/>
           <a:p>
             <a:r>
-              <a:rPr lang="pt-BR" dirty="0"/>
-              <a:t>Benefícios esperados</a:t>
+              <a:rPr lang="pt-BR" dirty="0" smtClean="0"/>
+              <a:t>Evolução do projeto</a:t>
             </a:r>
+            <a:endParaRPr lang="pt-BR" dirty="0"/>
           </a:p>
         </p:txBody>
       </p:sp>
@@ -14510,29 +14513,30 @@
           <a:lstStyle/>
           <a:p>
             <a:r>
-              <a:rPr lang="pt-BR" dirty="0"/>
-              <a:t>Redução do Lead time da esteira de aprovação de crédito, pois os analistas trabalharão propostas dos segmentos que melhor conhecem e terão o apoio da AI sugerindo um valor de crédito a ser concedido.</a:t>
+              <a:rPr lang="pt-BR" dirty="0" smtClean="0"/>
+              <a:t>Curadoria</a:t>
             </a:r>
+            <a:endParaRPr lang="pt-BR" dirty="0"/>
           </a:p>
           <a:p>
             <a:r>
-              <a:rPr lang="pt-BR" dirty="0"/>
-              <a:t>Iniciar uma trilha de utilização de dados para melhoria de processos e tomada de decisão</a:t>
+              <a:rPr lang="pt-BR" dirty="0" smtClean="0"/>
+              <a:t>Aprovação automática de crédito</a:t>
             </a:r>
+            <a:endParaRPr lang="pt-BR" dirty="0"/>
           </a:p>
           <a:p>
             <a:r>
-              <a:rPr lang="pt-BR" dirty="0"/>
-              <a:t>Facilitar planejamento financeiro utilizando o </a:t>
+              <a:rPr lang="pt-BR" dirty="0" smtClean="0"/>
+              <a:t>Forecast a longo prazo</a:t>
             </a:r>
-            <a:r>
-              <a:rPr lang="pt-BR" dirty="0" err="1"/>
-              <a:t>forecast</a:t>
-            </a:r>
-            <a:r>
-              <a:rPr lang="pt-BR" dirty="0"/>
-              <a:t> de concessão de crédito</a:t>
-            </a:r>
+            <a:endParaRPr lang="pt-BR" dirty="0" smtClean="0"/>
+          </a:p>
+          <a:p>
+            <a:pPr marL="0" indent="0">
+              <a:buNone/>
+            </a:pPr>
+            <a:endParaRPr lang="pt-BR" dirty="0"/>
           </a:p>
         </p:txBody>
       </p:sp>
@@ -14546,1067 +14550,13 @@
   <p:clrMapOvr>
     <a:masterClrMapping/>
   </p:clrMapOvr>
-</p:sld>
-</file>
-
-<file path=ppt/slides/slide11.xml><?xml version="1.0" encoding="utf-8"?>
-<p:sld xmlns:a="http://schemas.openxmlformats.org/drawingml/2006/main" xmlns:r="http://schemas.openxmlformats.org/officeDocument/2006/relationships" xmlns:p="http://schemas.openxmlformats.org/presentationml/2006/main" show="0">
-  <p:cSld>
-    <p:spTree>
-      <p:nvGrpSpPr>
-        <p:cNvPr id="1" name=""/>
-        <p:cNvGrpSpPr/>
-        <p:nvPr/>
-      </p:nvGrpSpPr>
-      <p:grpSpPr>
-        <a:xfrm>
-          <a:off x="0" y="0"/>
-          <a:ext cx="0" cy="0"/>
-          <a:chOff x="0" y="0"/>
-          <a:chExt cx="0" cy="0"/>
-        </a:xfrm>
-      </p:grpSpPr>
-      <p:sp>
-        <p:nvSpPr>
-          <p:cNvPr id="2" name="Título 1">
-            <a:extLst>
-              <a:ext uri="{FF2B5EF4-FFF2-40B4-BE49-F238E27FC236}">
-                <a16:creationId xmlns:a16="http://schemas.microsoft.com/office/drawing/2014/main" id="{CD663C5E-8DD2-4895-BFC9-8FA02DF7EC8E}"/>
-              </a:ext>
-            </a:extLst>
-          </p:cNvPr>
-          <p:cNvSpPr>
-            <a:spLocks noGrp="1"/>
-          </p:cNvSpPr>
-          <p:nvPr>
-            <p:ph type="title"/>
-          </p:nvPr>
-        </p:nvSpPr>
-        <p:spPr/>
-        <p:txBody>
-          <a:bodyPr/>
-          <a:lstStyle/>
-          <a:p>
-            <a:r>
-              <a:rPr lang="pt-BR"/>
-              <a:t>Apoio</a:t>
-            </a:r>
-          </a:p>
-        </p:txBody>
-      </p:sp>
-      <p:sp>
-        <p:nvSpPr>
-          <p:cNvPr id="5" name="CaixaDeTexto 4">
-            <a:extLst>
-              <a:ext uri="{FF2B5EF4-FFF2-40B4-BE49-F238E27FC236}">
-                <a16:creationId xmlns:a16="http://schemas.microsoft.com/office/drawing/2014/main" id="{C86061A5-BC7D-4360-8966-7661AE505D0D}"/>
-              </a:ext>
-            </a:extLst>
-          </p:cNvPr>
-          <p:cNvSpPr txBox="1"/>
-          <p:nvPr/>
-        </p:nvSpPr>
-        <p:spPr>
-          <a:xfrm>
-            <a:off x="639420" y="1520785"/>
-            <a:ext cx="11155017" cy="5047536"/>
-          </a:xfrm>
-          <a:prstGeom prst="rect">
-            <a:avLst/>
-          </a:prstGeom>
-          <a:noFill/>
-        </p:spPr>
-        <p:txBody>
-          <a:bodyPr wrap="square">
-            <a:spAutoFit/>
-          </a:bodyPr>
-          <a:lstStyle/>
-          <a:p>
-            <a:r>
-              <a:rPr lang="pt-BR" sz="1400"/>
-              <a:t>O que são matrizes de confusão?</a:t>
-            </a:r>
-          </a:p>
-          <a:p>
-            <a:endParaRPr lang="pt-BR" sz="1400"/>
-          </a:p>
-          <a:p>
-            <a:r>
-              <a:rPr lang="pt-BR" sz="1400"/>
-              <a:t>É um tabela que mostra as frequências de classificação para cada classe do modelo. </a:t>
-            </a:r>
-          </a:p>
-          <a:p>
-            <a:r>
-              <a:rPr lang="pt-BR" sz="1400"/>
-              <a:t>Exemplo: Imagine que </a:t>
-            </a:r>
-            <a:r>
-              <a:rPr lang="pt-BR" sz="1400" err="1"/>
-              <a:t>tivessemos</a:t>
-            </a:r>
-            <a:r>
-              <a:rPr lang="pt-BR" sz="1400"/>
-              <a:t> um modelo que, dada as características fisiológicas de uma paciente, dissesse que a mesma está grávida ou não. </a:t>
-            </a:r>
-          </a:p>
-          <a:p>
-            <a:r>
-              <a:rPr lang="pt-BR" sz="1400"/>
-              <a:t>Como saber se meu modelo previu bem? Como saber se ele prevê bem a classe que queremos (Grávida)? Essas e outras questões podemos entender com as matrizes de confusão.</a:t>
-            </a:r>
-          </a:p>
-          <a:p>
-            <a:r>
-              <a:rPr lang="pt-BR" sz="1400"/>
-              <a:t>Pegando o exemplo acima, ela vai nos mostrar as frequências:</a:t>
-            </a:r>
-          </a:p>
-          <a:p>
-            <a:r>
-              <a:rPr lang="pt-BR" sz="1400" b="1"/>
-              <a:t>Verdadeiro positivo (</a:t>
-            </a:r>
-            <a:r>
-              <a:rPr lang="pt-BR" sz="1400" b="1" err="1"/>
-              <a:t>true</a:t>
-            </a:r>
-            <a:r>
-              <a:rPr lang="pt-BR" sz="1400" b="1"/>
-              <a:t> positive — TP)</a:t>
-            </a:r>
-            <a:r>
-              <a:rPr lang="pt-BR" sz="1400"/>
-              <a:t>: ocorre quando no conjunto real, a classe que estamos buscando foi prevista corretamente. Por exemplo, quando a mulher está grávida e o modelo previu corretamente que ela está grávida.</a:t>
-            </a:r>
-          </a:p>
-          <a:p>
-            <a:r>
-              <a:rPr lang="pt-BR" sz="1400" b="1"/>
-              <a:t>Falso positivo (false positive — FP)</a:t>
-            </a:r>
-            <a:r>
-              <a:rPr lang="pt-BR" sz="1400"/>
-              <a:t>: ocorre quando no conjunto real, a classe que estamos buscando prever foi prevista incorretamente. Exemplo: a mulher não está grávida, mas o modelo disse que ela está.</a:t>
-            </a:r>
-          </a:p>
-          <a:p>
-            <a:r>
-              <a:rPr lang="pt-BR" sz="1400" b="1"/>
-              <a:t>Falso verdadeiro (</a:t>
-            </a:r>
-            <a:r>
-              <a:rPr lang="pt-BR" sz="1400" b="1" err="1"/>
-              <a:t>true</a:t>
-            </a:r>
-            <a:r>
-              <a:rPr lang="pt-BR" sz="1400" b="1"/>
-              <a:t> negative — TN)</a:t>
-            </a:r>
-            <a:r>
-              <a:rPr lang="pt-BR" sz="1400"/>
-              <a:t>: ocorre quando no conjunto real, a classe que não estamos buscando prever foi prevista corretamente. Exemplo: a mulher não estava grávida, e o modelo previu corretamente que ela não está.</a:t>
-            </a:r>
-          </a:p>
-          <a:p>
-            <a:r>
-              <a:rPr lang="pt-BR" sz="1400" b="1"/>
-              <a:t>Falso negativo (false negative — FN)</a:t>
-            </a:r>
-            <a:r>
-              <a:rPr lang="pt-BR" sz="1400"/>
-              <a:t>: ocorre quando no conjunto real, a classe que não estamos buscando prever foi prevista incorretamente. Por exemplo, quando a mulher está grávida e o modelo previu incorretamente que ela não está grávida.</a:t>
-            </a:r>
-          </a:p>
-          <a:p>
-            <a:endParaRPr lang="pt-BR" sz="1400"/>
-          </a:p>
-          <a:p>
-            <a:r>
-              <a:rPr lang="pt-BR" sz="1400"/>
-              <a:t>Matriz de Confusão mostrando as categorias</a:t>
-            </a:r>
-          </a:p>
-          <a:p>
-            <a:r>
-              <a:rPr lang="pt-BR" sz="1400"/>
-              <a:t>Assim, nosso modelo:</a:t>
-            </a:r>
-          </a:p>
-          <a:p>
-            <a:r>
-              <a:rPr lang="pt-BR" sz="1400"/>
-              <a:t>Previu grávida 3 vezes corretamente</a:t>
-            </a:r>
-          </a:p>
-          <a:p>
-            <a:r>
-              <a:rPr lang="pt-BR" sz="1400"/>
-              <a:t>Previu não grávidas 4 vezes corretamente</a:t>
-            </a:r>
-          </a:p>
-          <a:p>
-            <a:r>
-              <a:rPr lang="pt-BR" sz="1400"/>
-              <a:t>Previu grávida 1 vez incorretamente</a:t>
-            </a:r>
-          </a:p>
-          <a:p>
-            <a:r>
-              <a:rPr lang="pt-BR" sz="1400"/>
-              <a:t>Previu não grávida 2 vezes incorretamente</a:t>
-            </a:r>
-          </a:p>
-        </p:txBody>
-      </p:sp>
-      <p:pic>
-        <p:nvPicPr>
-          <p:cNvPr id="4" name="Imagem 3">
-            <a:extLst>
-              <a:ext uri="{FF2B5EF4-FFF2-40B4-BE49-F238E27FC236}">
-                <a16:creationId xmlns:a16="http://schemas.microsoft.com/office/drawing/2014/main" id="{107E4122-9C18-41A3-83D8-6E315B5CA43A}"/>
-              </a:ext>
-            </a:extLst>
-          </p:cNvPr>
-          <p:cNvPicPr>
-            <a:picLocks noChangeAspect="1"/>
-          </p:cNvPicPr>
-          <p:nvPr/>
-        </p:nvPicPr>
-        <p:blipFill rotWithShape="1">
-          <a:blip r:embed="rId2"/>
-          <a:srcRect t="18116"/>
-          <a:stretch/>
-        </p:blipFill>
-        <p:spPr>
-          <a:xfrm>
-            <a:off x="8115300" y="5641285"/>
-            <a:ext cx="4076700" cy="1216715"/>
-          </a:xfrm>
-          <a:prstGeom prst="rect">
-            <a:avLst/>
-          </a:prstGeom>
-        </p:spPr>
-      </p:pic>
-      <p:pic>
-        <p:nvPicPr>
-          <p:cNvPr id="7" name="Imagem 6">
-            <a:extLst>
-              <a:ext uri="{FF2B5EF4-FFF2-40B4-BE49-F238E27FC236}">
-                <a16:creationId xmlns:a16="http://schemas.microsoft.com/office/drawing/2014/main" id="{41507ED7-A5F8-4D6D-B7B9-925E636EDDD8}"/>
-              </a:ext>
-            </a:extLst>
-          </p:cNvPr>
-          <p:cNvPicPr>
-            <a:picLocks noChangeAspect="1"/>
-          </p:cNvPicPr>
-          <p:nvPr/>
-        </p:nvPicPr>
-        <p:blipFill rotWithShape="1">
-          <a:blip r:embed="rId3"/>
-          <a:srcRect b="30936"/>
-          <a:stretch/>
-        </p:blipFill>
-        <p:spPr>
-          <a:xfrm>
-            <a:off x="4640537" y="5041523"/>
-            <a:ext cx="5057775" cy="769665"/>
-          </a:xfrm>
-          <a:prstGeom prst="rect">
-            <a:avLst/>
-          </a:prstGeom>
-        </p:spPr>
-      </p:pic>
-      <p:pic>
-        <p:nvPicPr>
-          <p:cNvPr id="8" name="Imagem 7">
-            <a:extLst>
-              <a:ext uri="{FF2B5EF4-FFF2-40B4-BE49-F238E27FC236}">
-                <a16:creationId xmlns:a16="http://schemas.microsoft.com/office/drawing/2014/main" id="{6BB9217C-EED6-48F8-8023-567D7B34A832}"/>
-              </a:ext>
-            </a:extLst>
-          </p:cNvPr>
-          <p:cNvPicPr>
-            <a:picLocks noChangeAspect="1"/>
-          </p:cNvPicPr>
-          <p:nvPr/>
-        </p:nvPicPr>
-        <p:blipFill>
-          <a:blip r:embed="rId4"/>
-          <a:stretch>
-            <a:fillRect/>
-          </a:stretch>
-        </p:blipFill>
-        <p:spPr>
-          <a:xfrm>
-            <a:off x="5200650" y="5794623"/>
-            <a:ext cx="3009900" cy="1038225"/>
-          </a:xfrm>
-          <a:prstGeom prst="rect">
-            <a:avLst/>
-          </a:prstGeom>
-        </p:spPr>
-      </p:pic>
-    </p:spTree>
-    <p:extLst>
-      <p:ext uri="{BB962C8B-B14F-4D97-AF65-F5344CB8AC3E}">
-        <p14:creationId xmlns:p14="http://schemas.microsoft.com/office/powerpoint/2010/main" val="987290489"/>
-      </p:ext>
-    </p:extLst>
-  </p:cSld>
-  <p:clrMapOvr>
-    <a:masterClrMapping/>
-  </p:clrMapOvr>
-</p:sld>
-</file>
-
-<file path=ppt/slides/slide12.xml><?xml version="1.0" encoding="utf-8"?>
-<p:sld xmlns:a="http://schemas.openxmlformats.org/drawingml/2006/main" xmlns:r="http://schemas.openxmlformats.org/officeDocument/2006/relationships" xmlns:p="http://schemas.openxmlformats.org/presentationml/2006/main" show="0">
-  <p:cSld>
-    <p:spTree>
-      <p:nvGrpSpPr>
-        <p:cNvPr id="1" name=""/>
-        <p:cNvGrpSpPr/>
-        <p:nvPr/>
-      </p:nvGrpSpPr>
-      <p:grpSpPr>
-        <a:xfrm>
-          <a:off x="0" y="0"/>
-          <a:ext cx="0" cy="0"/>
-          <a:chOff x="0" y="0"/>
-          <a:chExt cx="0" cy="0"/>
-        </a:xfrm>
-      </p:grpSpPr>
-      <p:sp>
-        <p:nvSpPr>
-          <p:cNvPr id="2" name="Título 1">
-            <a:extLst>
-              <a:ext uri="{FF2B5EF4-FFF2-40B4-BE49-F238E27FC236}">
-                <a16:creationId xmlns:a16="http://schemas.microsoft.com/office/drawing/2014/main" id="{CD663C5E-8DD2-4895-BFC9-8FA02DF7EC8E}"/>
-              </a:ext>
-            </a:extLst>
-          </p:cNvPr>
-          <p:cNvSpPr>
-            <a:spLocks noGrp="1"/>
-          </p:cNvSpPr>
-          <p:nvPr>
-            <p:ph type="title"/>
-          </p:nvPr>
-        </p:nvSpPr>
-        <p:spPr/>
-        <p:txBody>
-          <a:bodyPr/>
-          <a:lstStyle/>
-          <a:p>
-            <a:r>
-              <a:rPr lang="pt-BR"/>
-              <a:t>Apoio</a:t>
-            </a:r>
-          </a:p>
-        </p:txBody>
-      </p:sp>
-      <p:sp>
-        <p:nvSpPr>
-          <p:cNvPr id="9" name="CaixaDeTexto 8">
-            <a:extLst>
-              <a:ext uri="{FF2B5EF4-FFF2-40B4-BE49-F238E27FC236}">
-                <a16:creationId xmlns:a16="http://schemas.microsoft.com/office/drawing/2014/main" id="{8F1E7B47-D1A2-467C-8A21-29C0BF7F5602}"/>
-              </a:ext>
-            </a:extLst>
-          </p:cNvPr>
-          <p:cNvSpPr txBox="1"/>
-          <p:nvPr/>
-        </p:nvSpPr>
-        <p:spPr>
-          <a:xfrm>
-            <a:off x="569843" y="1443264"/>
-            <a:ext cx="11118573" cy="2339102"/>
-          </a:xfrm>
-          <a:prstGeom prst="rect">
-            <a:avLst/>
-          </a:prstGeom>
-          <a:noFill/>
-        </p:spPr>
-        <p:txBody>
-          <a:bodyPr wrap="square">
-            <a:spAutoFit/>
-          </a:bodyPr>
-          <a:lstStyle/>
-          <a:p>
-            <a:r>
-              <a:rPr lang="pt-BR" sz="2000" b="1"/>
-              <a:t>Alguns conceitos importantes decorrentes da matriz</a:t>
-            </a:r>
-          </a:p>
-          <a:p>
-            <a:endParaRPr lang="pt-BR"/>
-          </a:p>
-          <a:p>
-            <a:r>
-              <a:rPr lang="pt-BR" u="sng"/>
-              <a:t>Acurácia</a:t>
-            </a:r>
-          </a:p>
-          <a:p>
-            <a:endParaRPr lang="pt-BR" u="sng"/>
-          </a:p>
-          <a:p>
-            <a:r>
-              <a:rPr lang="pt-BR"/>
-              <a:t>Diz quanto o meu modelo acertou das previsões possíveis. No contexto acima, nosso modelo teve uma acurácia de 70%, pois acertou 7 das 10 previsões. E a razão entre o somatório das previsões corretas (verdadeiros positivos com verdadeiros negativos) sobre o somatório das previsões.</a:t>
-            </a:r>
-          </a:p>
-        </p:txBody>
-      </p:sp>
-      <p:pic>
-        <p:nvPicPr>
-          <p:cNvPr id="11" name="Imagem 10">
-            <a:extLst>
-              <a:ext uri="{FF2B5EF4-FFF2-40B4-BE49-F238E27FC236}">
-                <a16:creationId xmlns:a16="http://schemas.microsoft.com/office/drawing/2014/main" id="{A3B297FD-DC38-47A1-BAEC-1613FCF5FDD3}"/>
-              </a:ext>
-            </a:extLst>
-          </p:cNvPr>
-          <p:cNvPicPr>
-            <a:picLocks noChangeAspect="1"/>
-          </p:cNvPicPr>
-          <p:nvPr/>
-        </p:nvPicPr>
-        <p:blipFill>
-          <a:blip r:embed="rId2"/>
-          <a:stretch>
-            <a:fillRect/>
-          </a:stretch>
-        </p:blipFill>
-        <p:spPr>
-          <a:xfrm>
-            <a:off x="2831684" y="4032368"/>
-            <a:ext cx="5486400" cy="1276350"/>
-          </a:xfrm>
-          <a:prstGeom prst="rect">
-            <a:avLst/>
-          </a:prstGeom>
-        </p:spPr>
-      </p:pic>
-    </p:spTree>
-    <p:extLst>
-      <p:ext uri="{BB962C8B-B14F-4D97-AF65-F5344CB8AC3E}">
-        <p14:creationId xmlns:p14="http://schemas.microsoft.com/office/powerpoint/2010/main" val="177394533"/>
-      </p:ext>
-    </p:extLst>
-  </p:cSld>
-  <p:clrMapOvr>
-    <a:masterClrMapping/>
-  </p:clrMapOvr>
-</p:sld>
-</file>
-
-<file path=ppt/slides/slide13.xml><?xml version="1.0" encoding="utf-8"?>
-<p:sld xmlns:a="http://schemas.openxmlformats.org/drawingml/2006/main" xmlns:r="http://schemas.openxmlformats.org/officeDocument/2006/relationships" xmlns:p="http://schemas.openxmlformats.org/presentationml/2006/main" show="0">
-  <p:cSld>
-    <p:spTree>
-      <p:nvGrpSpPr>
-        <p:cNvPr id="1" name=""/>
-        <p:cNvGrpSpPr/>
-        <p:nvPr/>
-      </p:nvGrpSpPr>
-      <p:grpSpPr>
-        <a:xfrm>
-          <a:off x="0" y="0"/>
-          <a:ext cx="0" cy="0"/>
-          <a:chOff x="0" y="0"/>
-          <a:chExt cx="0" cy="0"/>
-        </a:xfrm>
-      </p:grpSpPr>
-      <p:sp>
-        <p:nvSpPr>
-          <p:cNvPr id="2" name="Título 1">
-            <a:extLst>
-              <a:ext uri="{FF2B5EF4-FFF2-40B4-BE49-F238E27FC236}">
-                <a16:creationId xmlns:a16="http://schemas.microsoft.com/office/drawing/2014/main" id="{CD663C5E-8DD2-4895-BFC9-8FA02DF7EC8E}"/>
-              </a:ext>
-            </a:extLst>
-          </p:cNvPr>
-          <p:cNvSpPr>
-            <a:spLocks noGrp="1"/>
-          </p:cNvSpPr>
-          <p:nvPr>
-            <p:ph type="title"/>
-          </p:nvPr>
-        </p:nvSpPr>
-        <p:spPr/>
-        <p:txBody>
-          <a:bodyPr/>
-          <a:lstStyle/>
-          <a:p>
-            <a:r>
-              <a:rPr lang="pt-BR"/>
-              <a:t>Apoio</a:t>
-            </a:r>
-          </a:p>
-        </p:txBody>
-      </p:sp>
-      <p:sp>
-        <p:nvSpPr>
-          <p:cNvPr id="9" name="CaixaDeTexto 8">
-            <a:extLst>
-              <a:ext uri="{FF2B5EF4-FFF2-40B4-BE49-F238E27FC236}">
-                <a16:creationId xmlns:a16="http://schemas.microsoft.com/office/drawing/2014/main" id="{8F1E7B47-D1A2-467C-8A21-29C0BF7F5602}"/>
-              </a:ext>
-            </a:extLst>
-          </p:cNvPr>
-          <p:cNvSpPr txBox="1"/>
-          <p:nvPr/>
-        </p:nvSpPr>
-        <p:spPr>
-          <a:xfrm>
-            <a:off x="569843" y="1443264"/>
-            <a:ext cx="11118573" cy="2339102"/>
-          </a:xfrm>
-          <a:prstGeom prst="rect">
-            <a:avLst/>
-          </a:prstGeom>
-          <a:noFill/>
-        </p:spPr>
-        <p:txBody>
-          <a:bodyPr wrap="square">
-            <a:spAutoFit/>
-          </a:bodyPr>
-          <a:lstStyle/>
-          <a:p>
-            <a:r>
-              <a:rPr lang="pt-BR" sz="2000" b="1"/>
-              <a:t>Alguns conceitos importantes decorrentes da matriz</a:t>
-            </a:r>
-          </a:p>
-          <a:p>
-            <a:endParaRPr lang="pt-BR"/>
-          </a:p>
-          <a:p>
-            <a:pPr algn="l"/>
-            <a:r>
-              <a:rPr lang="pt-BR" b="1" i="0" u="sng">
-                <a:solidFill>
-                  <a:srgbClr val="292929"/>
-                </a:solidFill>
-                <a:effectLst/>
-                <a:latin typeface="sohne"/>
-              </a:rPr>
-              <a:t>Recall</a:t>
-            </a:r>
-          </a:p>
-          <a:p>
-            <a:pPr algn="l"/>
-            <a:endParaRPr lang="pt-BR" b="0" i="0">
-              <a:solidFill>
-                <a:srgbClr val="292929"/>
-              </a:solidFill>
-              <a:effectLst/>
-              <a:latin typeface="sohne"/>
-            </a:endParaRPr>
-          </a:p>
-          <a:p>
-            <a:pPr algn="l"/>
-            <a:r>
-              <a:rPr lang="pt-BR" b="0" i="0">
-                <a:solidFill>
-                  <a:srgbClr val="292929"/>
-                </a:solidFill>
-                <a:effectLst/>
-                <a:latin typeface="charter"/>
-              </a:rPr>
-              <a:t>No material do </a:t>
-            </a:r>
-            <a:r>
-              <a:rPr lang="pt-BR" b="0" i="0" u="sng">
-                <a:solidFill>
-                  <a:srgbClr val="292929"/>
-                </a:solidFill>
-                <a:effectLst/>
-                <a:latin typeface="charter"/>
-                <a:hlinkClick r:id="rId2"/>
-              </a:rPr>
-              <a:t>Google </a:t>
-            </a:r>
-            <a:r>
-              <a:rPr lang="pt-BR" b="0" i="0" u="sng" err="1">
-                <a:solidFill>
-                  <a:srgbClr val="292929"/>
-                </a:solidFill>
-                <a:effectLst/>
-                <a:latin typeface="charter"/>
-                <a:hlinkClick r:id="rId2"/>
-              </a:rPr>
-              <a:t>Developers</a:t>
-            </a:r>
-            <a:r>
-              <a:rPr lang="pt-BR" b="0" i="0" u="sng">
-                <a:solidFill>
-                  <a:srgbClr val="292929"/>
-                </a:solidFill>
-                <a:effectLst/>
-                <a:latin typeface="charter"/>
-                <a:hlinkClick r:id="rId2"/>
-              </a:rPr>
-              <a:t> para Machine Learning</a:t>
-            </a:r>
-            <a:r>
-              <a:rPr lang="pt-BR" b="0" i="0">
-                <a:solidFill>
-                  <a:srgbClr val="292929"/>
-                </a:solidFill>
-                <a:effectLst/>
-                <a:latin typeface="charter"/>
-              </a:rPr>
-              <a:t>, podemos ver que </a:t>
-            </a:r>
-            <a:r>
-              <a:rPr lang="pt-BR" b="0" i="1">
-                <a:solidFill>
-                  <a:srgbClr val="292929"/>
-                </a:solidFill>
-                <a:effectLst/>
-                <a:latin typeface="charter"/>
-              </a:rPr>
-              <a:t>recall</a:t>
-            </a:r>
-            <a:r>
-              <a:rPr lang="pt-BR" b="0" i="0">
-                <a:solidFill>
-                  <a:srgbClr val="292929"/>
-                </a:solidFill>
-                <a:effectLst/>
-                <a:latin typeface="charter"/>
-              </a:rPr>
-              <a:t> responde a seguinte pergunta: qual proporção de positivos foi identificados corretamente? Em outras palavras, quão bom meu modelo é para prever positivos, sendo positivo entendido como a classe que se quer prever, no nosso contexto, se a mulher está grávida. É definido como a razão entre verdadeiros positivos sobre a soma de verdadeiros positivos com negativos falsos.</a:t>
-            </a:r>
-          </a:p>
-        </p:txBody>
-      </p:sp>
-      <p:pic>
-        <p:nvPicPr>
-          <p:cNvPr id="4" name="Imagem 3">
-            <a:extLst>
-              <a:ext uri="{FF2B5EF4-FFF2-40B4-BE49-F238E27FC236}">
-                <a16:creationId xmlns:a16="http://schemas.microsoft.com/office/drawing/2014/main" id="{DCE87EB6-4C05-4B37-94FD-2DDEF99F44F5}"/>
-              </a:ext>
-            </a:extLst>
-          </p:cNvPr>
-          <p:cNvPicPr>
-            <a:picLocks noChangeAspect="1"/>
-          </p:cNvPicPr>
-          <p:nvPr/>
-        </p:nvPicPr>
-        <p:blipFill>
-          <a:blip r:embed="rId3"/>
-          <a:stretch>
-            <a:fillRect/>
-          </a:stretch>
-        </p:blipFill>
-        <p:spPr>
-          <a:xfrm>
-            <a:off x="4357687" y="4341392"/>
-            <a:ext cx="2257425" cy="1038225"/>
-          </a:xfrm>
-          <a:prstGeom prst="rect">
-            <a:avLst/>
-          </a:prstGeom>
-        </p:spPr>
-      </p:pic>
-    </p:spTree>
-    <p:extLst>
-      <p:ext uri="{BB962C8B-B14F-4D97-AF65-F5344CB8AC3E}">
-        <p14:creationId xmlns:p14="http://schemas.microsoft.com/office/powerpoint/2010/main" val="317337308"/>
-      </p:ext>
-    </p:extLst>
-  </p:cSld>
-  <p:clrMapOvr>
-    <a:masterClrMapping/>
-  </p:clrMapOvr>
-</p:sld>
-</file>
-
-<file path=ppt/slides/slide14.xml><?xml version="1.0" encoding="utf-8"?>
-<p:sld xmlns:a="http://schemas.openxmlformats.org/drawingml/2006/main" xmlns:r="http://schemas.openxmlformats.org/officeDocument/2006/relationships" xmlns:p="http://schemas.openxmlformats.org/presentationml/2006/main" show="0">
-  <p:cSld>
-    <p:spTree>
-      <p:nvGrpSpPr>
-        <p:cNvPr id="1" name=""/>
-        <p:cNvGrpSpPr/>
-        <p:nvPr/>
-      </p:nvGrpSpPr>
-      <p:grpSpPr>
-        <a:xfrm>
-          <a:off x="0" y="0"/>
-          <a:ext cx="0" cy="0"/>
-          <a:chOff x="0" y="0"/>
-          <a:chExt cx="0" cy="0"/>
-        </a:xfrm>
-      </p:grpSpPr>
-      <p:sp>
-        <p:nvSpPr>
-          <p:cNvPr id="2" name="Título 1">
-            <a:extLst>
-              <a:ext uri="{FF2B5EF4-FFF2-40B4-BE49-F238E27FC236}">
-                <a16:creationId xmlns:a16="http://schemas.microsoft.com/office/drawing/2014/main" id="{CD663C5E-8DD2-4895-BFC9-8FA02DF7EC8E}"/>
-              </a:ext>
-            </a:extLst>
-          </p:cNvPr>
-          <p:cNvSpPr>
-            <a:spLocks noGrp="1"/>
-          </p:cNvSpPr>
-          <p:nvPr>
-            <p:ph type="title"/>
-          </p:nvPr>
-        </p:nvSpPr>
-        <p:spPr/>
-        <p:txBody>
-          <a:bodyPr/>
-          <a:lstStyle/>
-          <a:p>
-            <a:r>
-              <a:rPr lang="pt-BR"/>
-              <a:t>Apoio</a:t>
-            </a:r>
-          </a:p>
-        </p:txBody>
-      </p:sp>
-      <p:sp>
-        <p:nvSpPr>
-          <p:cNvPr id="9" name="CaixaDeTexto 8">
-            <a:extLst>
-              <a:ext uri="{FF2B5EF4-FFF2-40B4-BE49-F238E27FC236}">
-                <a16:creationId xmlns:a16="http://schemas.microsoft.com/office/drawing/2014/main" id="{8F1E7B47-D1A2-467C-8A21-29C0BF7F5602}"/>
-              </a:ext>
-            </a:extLst>
-          </p:cNvPr>
-          <p:cNvSpPr txBox="1"/>
-          <p:nvPr/>
-        </p:nvSpPr>
-        <p:spPr>
-          <a:xfrm>
-            <a:off x="569843" y="1443264"/>
-            <a:ext cx="11118573" cy="2062103"/>
-          </a:xfrm>
-          <a:prstGeom prst="rect">
-            <a:avLst/>
-          </a:prstGeom>
-          <a:noFill/>
-        </p:spPr>
-        <p:txBody>
-          <a:bodyPr wrap="square">
-            <a:spAutoFit/>
-          </a:bodyPr>
-          <a:lstStyle/>
-          <a:p>
-            <a:r>
-              <a:rPr lang="pt-BR" sz="2000" b="1"/>
-              <a:t>Alguns conceitos importantes decorrentes da matriz</a:t>
-            </a:r>
-          </a:p>
-          <a:p>
-            <a:endParaRPr lang="pt-BR"/>
-          </a:p>
-          <a:p>
-            <a:pPr algn="l"/>
-            <a:r>
-              <a:rPr lang="pt-BR" b="1" i="0" u="sng">
-                <a:solidFill>
-                  <a:srgbClr val="292929"/>
-                </a:solidFill>
-                <a:effectLst/>
-                <a:latin typeface="sohne"/>
-              </a:rPr>
-              <a:t>Precisão</a:t>
-            </a:r>
-          </a:p>
-          <a:p>
-            <a:pPr algn="l"/>
-            <a:endParaRPr lang="pt-BR" b="0" i="0">
-              <a:solidFill>
-                <a:srgbClr val="292929"/>
-              </a:solidFill>
-              <a:effectLst/>
-              <a:latin typeface="sohne"/>
-            </a:endParaRPr>
-          </a:p>
-          <a:p>
-            <a:pPr algn="l"/>
-            <a:r>
-              <a:rPr lang="pt-BR" b="0" i="0">
-                <a:solidFill>
-                  <a:srgbClr val="292929"/>
-                </a:solidFill>
-                <a:effectLst/>
-                <a:latin typeface="charter"/>
-              </a:rPr>
-              <a:t>Ainda usando o material do Google </a:t>
-            </a:r>
-            <a:r>
-              <a:rPr lang="pt-BR" b="0" i="0" err="1">
-                <a:solidFill>
-                  <a:srgbClr val="292929"/>
-                </a:solidFill>
-                <a:effectLst/>
-                <a:latin typeface="charter"/>
-              </a:rPr>
-              <a:t>Developers</a:t>
-            </a:r>
-            <a:r>
-              <a:rPr lang="pt-BR" b="0" i="0">
-                <a:solidFill>
-                  <a:srgbClr val="292929"/>
-                </a:solidFill>
-                <a:effectLst/>
-                <a:latin typeface="charter"/>
-              </a:rPr>
-              <a:t>, eles definem precisão como a resposta para a seguinte pergunta: Qual a proporção de identificações positivas foi realmente correta? Em outras palavras, o qual bem meu modelo trabalhou.</a:t>
-            </a:r>
-          </a:p>
-        </p:txBody>
-      </p:sp>
-      <p:pic>
-        <p:nvPicPr>
-          <p:cNvPr id="5" name="Imagem 4">
-            <a:extLst>
-              <a:ext uri="{FF2B5EF4-FFF2-40B4-BE49-F238E27FC236}">
-                <a16:creationId xmlns:a16="http://schemas.microsoft.com/office/drawing/2014/main" id="{EAE08412-E78C-4B9A-88C3-09260AA42A13}"/>
-              </a:ext>
-            </a:extLst>
-          </p:cNvPr>
-          <p:cNvPicPr>
-            <a:picLocks noChangeAspect="1"/>
-          </p:cNvPicPr>
-          <p:nvPr/>
-        </p:nvPicPr>
-        <p:blipFill>
-          <a:blip r:embed="rId2"/>
-          <a:stretch>
-            <a:fillRect/>
-          </a:stretch>
-        </p:blipFill>
-        <p:spPr>
-          <a:xfrm>
-            <a:off x="4609074" y="4199572"/>
-            <a:ext cx="2495550" cy="1019175"/>
-          </a:xfrm>
-          <a:prstGeom prst="rect">
-            <a:avLst/>
-          </a:prstGeom>
-        </p:spPr>
-      </p:pic>
-    </p:spTree>
-    <p:extLst>
-      <p:ext uri="{BB962C8B-B14F-4D97-AF65-F5344CB8AC3E}">
-        <p14:creationId xmlns:p14="http://schemas.microsoft.com/office/powerpoint/2010/main" val="2653696886"/>
-      </p:ext>
-    </p:extLst>
-  </p:cSld>
-  <p:clrMapOvr>
-    <a:masterClrMapping/>
-  </p:clrMapOvr>
-</p:sld>
-</file>
-
-<file path=ppt/slides/slide15.xml><?xml version="1.0" encoding="utf-8"?>
-<p:sld xmlns:a="http://schemas.openxmlformats.org/drawingml/2006/main" xmlns:r="http://schemas.openxmlformats.org/officeDocument/2006/relationships" xmlns:p="http://schemas.openxmlformats.org/presentationml/2006/main" show="0">
-  <p:cSld>
-    <p:spTree>
-      <p:nvGrpSpPr>
-        <p:cNvPr id="1" name=""/>
-        <p:cNvGrpSpPr/>
-        <p:nvPr/>
-      </p:nvGrpSpPr>
-      <p:grpSpPr>
-        <a:xfrm>
-          <a:off x="0" y="0"/>
-          <a:ext cx="0" cy="0"/>
-          <a:chOff x="0" y="0"/>
-          <a:chExt cx="0" cy="0"/>
-        </a:xfrm>
-      </p:grpSpPr>
-      <p:sp>
-        <p:nvSpPr>
-          <p:cNvPr id="2" name="Título 1">
-            <a:extLst>
-              <a:ext uri="{FF2B5EF4-FFF2-40B4-BE49-F238E27FC236}">
-                <a16:creationId xmlns:a16="http://schemas.microsoft.com/office/drawing/2014/main" id="{CD663C5E-8DD2-4895-BFC9-8FA02DF7EC8E}"/>
-              </a:ext>
-            </a:extLst>
-          </p:cNvPr>
-          <p:cNvSpPr>
-            <a:spLocks noGrp="1"/>
-          </p:cNvSpPr>
-          <p:nvPr>
-            <p:ph type="title"/>
-          </p:nvPr>
-        </p:nvSpPr>
-        <p:spPr/>
-        <p:txBody>
-          <a:bodyPr/>
-          <a:lstStyle/>
-          <a:p>
-            <a:r>
-              <a:rPr lang="pt-BR"/>
-              <a:t>Apoio</a:t>
-            </a:r>
-          </a:p>
-        </p:txBody>
-      </p:sp>
-      <p:sp>
-        <p:nvSpPr>
-          <p:cNvPr id="9" name="CaixaDeTexto 8">
-            <a:extLst>
-              <a:ext uri="{FF2B5EF4-FFF2-40B4-BE49-F238E27FC236}">
-                <a16:creationId xmlns:a16="http://schemas.microsoft.com/office/drawing/2014/main" id="{8F1E7B47-D1A2-467C-8A21-29C0BF7F5602}"/>
-              </a:ext>
-            </a:extLst>
-          </p:cNvPr>
-          <p:cNvSpPr txBox="1"/>
-          <p:nvPr/>
-        </p:nvSpPr>
-        <p:spPr>
-          <a:xfrm>
-            <a:off x="569843" y="1443264"/>
-            <a:ext cx="11118573" cy="1508105"/>
-          </a:xfrm>
-          <a:prstGeom prst="rect">
-            <a:avLst/>
-          </a:prstGeom>
-          <a:noFill/>
-        </p:spPr>
-        <p:txBody>
-          <a:bodyPr wrap="square">
-            <a:spAutoFit/>
-          </a:bodyPr>
-          <a:lstStyle/>
-          <a:p>
-            <a:r>
-              <a:rPr lang="pt-BR" sz="2000" b="1"/>
-              <a:t>Alguns conceitos importantes decorrentes da matriz</a:t>
-            </a:r>
-          </a:p>
-          <a:p>
-            <a:endParaRPr lang="pt-BR"/>
-          </a:p>
-          <a:p>
-            <a:pPr algn="l"/>
-            <a:r>
-              <a:rPr lang="pt-BR" b="1" i="0" u="sng">
-                <a:solidFill>
-                  <a:srgbClr val="292929"/>
-                </a:solidFill>
-                <a:effectLst/>
-                <a:latin typeface="sohne"/>
-              </a:rPr>
-              <a:t>f-score</a:t>
-            </a:r>
-          </a:p>
-          <a:p>
-            <a:pPr algn="l"/>
-            <a:endParaRPr lang="pt-BR" b="0" i="0">
-              <a:solidFill>
-                <a:srgbClr val="292929"/>
-              </a:solidFill>
-              <a:effectLst/>
-              <a:latin typeface="sohne"/>
-            </a:endParaRPr>
-          </a:p>
-          <a:p>
-            <a:pPr algn="l"/>
-            <a:r>
-              <a:rPr lang="pt-BR" b="0" i="0">
-                <a:solidFill>
-                  <a:srgbClr val="292929"/>
-                </a:solidFill>
-                <a:effectLst/>
-                <a:latin typeface="charter"/>
-              </a:rPr>
-              <a:t>Já o </a:t>
-            </a:r>
-            <a:r>
-              <a:rPr lang="pt-BR" b="0" i="1">
-                <a:solidFill>
-                  <a:srgbClr val="292929"/>
-                </a:solidFill>
-                <a:effectLst/>
-                <a:latin typeface="charter"/>
-              </a:rPr>
-              <a:t>f-score</a:t>
-            </a:r>
-            <a:r>
-              <a:rPr lang="pt-BR" b="0" i="0">
-                <a:solidFill>
-                  <a:srgbClr val="292929"/>
-                </a:solidFill>
-                <a:effectLst/>
-                <a:latin typeface="charter"/>
-              </a:rPr>
-              <a:t> nos mostra o balanço entre a precisão e o </a:t>
-            </a:r>
-            <a:r>
-              <a:rPr lang="pt-BR" b="0" i="1">
-                <a:solidFill>
-                  <a:srgbClr val="292929"/>
-                </a:solidFill>
-                <a:effectLst/>
-                <a:latin typeface="charter"/>
-              </a:rPr>
-              <a:t>recall</a:t>
-            </a:r>
-            <a:r>
-              <a:rPr lang="pt-BR" b="0" i="0">
-                <a:solidFill>
-                  <a:srgbClr val="292929"/>
-                </a:solidFill>
-                <a:effectLst/>
-                <a:latin typeface="charter"/>
-              </a:rPr>
-              <a:t> de nosso modelo. Sua fórmula é:</a:t>
-            </a:r>
-          </a:p>
-        </p:txBody>
-      </p:sp>
-      <p:pic>
-        <p:nvPicPr>
-          <p:cNvPr id="4" name="Imagem 3">
-            <a:extLst>
-              <a:ext uri="{FF2B5EF4-FFF2-40B4-BE49-F238E27FC236}">
-                <a16:creationId xmlns:a16="http://schemas.microsoft.com/office/drawing/2014/main" id="{DBBEDC4F-78AA-4516-85C8-2AE67601E997}"/>
-              </a:ext>
-            </a:extLst>
-          </p:cNvPr>
-          <p:cNvPicPr>
-            <a:picLocks noChangeAspect="1"/>
-          </p:cNvPicPr>
-          <p:nvPr/>
-        </p:nvPicPr>
-        <p:blipFill>
-          <a:blip r:embed="rId2"/>
-          <a:stretch>
-            <a:fillRect/>
-          </a:stretch>
-        </p:blipFill>
-        <p:spPr>
-          <a:xfrm>
-            <a:off x="3910219" y="3982832"/>
-            <a:ext cx="2781300" cy="1019175"/>
-          </a:xfrm>
-          <a:prstGeom prst="rect">
-            <a:avLst/>
-          </a:prstGeom>
-        </p:spPr>
-      </p:pic>
-    </p:spTree>
-    <p:extLst>
-      <p:ext uri="{BB962C8B-B14F-4D97-AF65-F5344CB8AC3E}">
-        <p14:creationId xmlns:p14="http://schemas.microsoft.com/office/powerpoint/2010/main" val="3300857036"/>
-      </p:ext>
-    </p:extLst>
-  </p:cSld>
-  <p:clrMapOvr>
-    <a:masterClrMapping/>
-  </p:clrMapOvr>
+  <p:timing>
+    <p:tnLst>
+      <p:par>
+        <p:cTn id="1" dur="indefinite" restart="never" nodeType="tmRoot"/>
+      </p:par>
+    </p:tnLst>
+  </p:timing>
 </p:sld>
 </file>
 
@@ -15643,7 +14593,7 @@
                 <a16:creationId xmlns:a16="http://schemas.microsoft.com/office/drawing/2014/main" id="{A0339EE9-5436-4860-BBFC-7CD7C90DBAE8}"/>
               </a:ext>
               <a:ext uri="{C183D7F6-B498-43B3-948B-1728B52AA6E4}">
-                <adec:decorative xmlns:adec="http://schemas.microsoft.com/office/drawing/2017/decorative" val="1"/>
+                <adec:decorative xmlns:adec="http://schemas.microsoft.com/office/drawing/2017/decorative" xmlns="" val="1"/>
               </a:ext>
             </a:extLst>
           </p:cNvPr>
@@ -15703,7 +14653,7 @@
                 <a16:creationId xmlns:a16="http://schemas.microsoft.com/office/drawing/2014/main" id="{AA770EBD-5B77-46EC-BF58-EF27ACD6B47C}"/>
               </a:ext>
               <a:ext uri="{C183D7F6-B498-43B3-948B-1728B52AA6E4}">
-                <adec:decorative xmlns:adec="http://schemas.microsoft.com/office/drawing/2017/decorative" val="1"/>
+                <adec:decorative xmlns:adec="http://schemas.microsoft.com/office/drawing/2017/decorative" xmlns="" val="1"/>
               </a:ext>
             </a:extLst>
           </p:cNvPr>
@@ -16768,8 +15718,16 @@
           <a:lstStyle/>
           <a:p>
             <a:r>
-              <a:rPr lang="pt-BR" sz="2000"/>
-              <a:t>Desenvolver um algoritmo para analise de concessão de crédito para o cliente Wtec Suprimentos.</a:t>
+              <a:rPr lang="pt-BR" sz="2000" dirty="0"/>
+              <a:t>Desenvolver um algoritmo para analise de concessão de crédito para o cliente </a:t>
+            </a:r>
+            <a:r>
+              <a:rPr lang="pt-BR" sz="2000" dirty="0" err="1"/>
+              <a:t>Wtec</a:t>
+            </a:r>
+            <a:r>
+              <a:rPr lang="pt-BR" sz="2000" dirty="0"/>
+              <a:t> Suprimentos.</a:t>
             </a:r>
           </a:p>
         </p:txBody>
@@ -16949,10 +15907,7 @@
           <a:lstStyle/>
           <a:p>
             <a:r>
-              <a:rPr lang="pt-BR" dirty="0">
-                <a:ea typeface="+mn-lt"/>
-                <a:cs typeface="+mn-lt"/>
-              </a:rPr>
+              <a:rPr lang="pt-BR" dirty="0"/>
               <a:t>Atualmente a empresa não tem um processo estabelecido para segmentar os clientes que impede os especialistas atuarem de forma efetiva nos processos de concessão de crédito.</a:t>
             </a:r>
           </a:p>
@@ -16974,6 +15929,13 @@
   <p:clrMapOvr>
     <a:masterClrMapping/>
   </p:clrMapOvr>
+  <p:timing>
+    <p:tnLst>
+      <p:par>
+        <p:cTn id="1" dur="indefinite" restart="never" nodeType="tmRoot"/>
+      </p:par>
+    </p:tnLst>
+  </p:timing>
 </p:sld>
 </file>
 
@@ -17079,7 +16041,7 @@
             <a:endParaRPr lang="en-US" dirty="0"/>
           </a:p>
           <a:p>
-            <a:endParaRPr lang="pt-BR"/>
+            <a:endParaRPr lang="pt-BR" dirty="0"/>
           </a:p>
         </p:txBody>
       </p:sp>
@@ -17093,6 +16055,13 @@
   <p:clrMapOvr>
     <a:masterClrMapping/>
   </p:clrMapOvr>
+  <p:timing>
+    <p:tnLst>
+      <p:par>
+        <p:cTn id="1" dur="indefinite" restart="never" nodeType="tmRoot"/>
+      </p:par>
+    </p:tnLst>
+  </p:timing>
 </p:sld>
 </file>
 
@@ -17170,7 +16139,7 @@
           <a:lstStyle/>
           <a:p>
             <a:r>
-              <a:rPr lang="pt-BR" sz="1600">
+              <a:rPr lang="pt-BR" sz="1600" dirty="0">
                 <a:ea typeface="+mn-lt"/>
                 <a:cs typeface="+mn-lt"/>
               </a:rPr>
@@ -17179,19 +16148,22 @@
           </a:p>
           <a:p>
             <a:r>
-              <a:rPr lang="pt-BR" sz="1600"/>
+              <a:rPr lang="pt-BR" sz="1600" dirty="0"/>
               <a:t>Os atributos selecionados são "dados cadastrais", de forma a permitir a classificação de clientes atuais e novos.</a:t>
             </a:r>
           </a:p>
           <a:p>
-            <a:endParaRPr lang="pt-BR" sz="1400"/>
+            <a:endParaRPr lang="pt-BR" sz="1400" dirty="0" smtClean="0"/>
+          </a:p>
+          <a:p>
+            <a:endParaRPr lang="pt-BR" sz="1400" dirty="0"/>
           </a:p>
           <a:p>
             <a:pPr marL="0" indent="0">
               <a:buNone/>
             </a:pPr>
             <a:r>
-              <a:rPr lang="pt-BR" sz="1200"/>
+              <a:rPr lang="pt-BR" sz="1000" dirty="0"/>
               <a:t># Etapas realizadas:</a:t>
             </a:r>
           </a:p>
@@ -17200,7 +16172,7 @@
               <a:buNone/>
             </a:pPr>
             <a:r>
-              <a:rPr lang="pt-BR" sz="1200"/>
+              <a:rPr lang="pt-BR" sz="1000" dirty="0"/>
               <a:t>1- Limpeza dos dados, normalização e escolha de características relevantes;</a:t>
             </a:r>
           </a:p>
@@ -17209,7 +16181,7 @@
               <a:buNone/>
             </a:pPr>
             <a:r>
-              <a:rPr lang="pt-BR" sz="1200"/>
+              <a:rPr lang="pt-BR" sz="1000" dirty="0"/>
               <a:t>2- Filtragem dos dados disponibilizados (Faturamento Bruto &gt;= R$ 1.000,00 e &lt;= R$100.000.000,00 mensais);</a:t>
             </a:r>
           </a:p>
@@ -17218,31 +16190,31 @@
               <a:buNone/>
             </a:pPr>
             <a:r>
-              <a:rPr lang="pt-BR" sz="1200"/>
+              <a:rPr lang="pt-BR" sz="1000" dirty="0"/>
               <a:t>3- Testes de 2 a 20 clusters com </a:t>
             </a:r>
             <a:r>
-              <a:rPr lang="pt-BR" sz="1200" err="1"/>
+              <a:rPr lang="pt-BR" sz="1000" dirty="0" err="1"/>
               <a:t>KMeans</a:t>
             </a:r>
             <a:r>
-              <a:rPr lang="pt-BR" sz="1200"/>
+              <a:rPr lang="pt-BR" sz="1000" dirty="0"/>
               <a:t>, sendo que a melhor separação foi de 8 clusters (considerando </a:t>
             </a:r>
             <a:r>
-              <a:rPr lang="pt-BR" sz="1200" err="1"/>
+              <a:rPr lang="pt-BR" sz="1000" dirty="0" err="1"/>
               <a:t>Elbow</a:t>
             </a:r>
             <a:r>
-              <a:rPr lang="pt-BR" sz="1200"/>
+              <a:rPr lang="pt-BR" sz="1000" dirty="0"/>
               <a:t>, </a:t>
             </a:r>
             <a:r>
-              <a:rPr lang="pt-BR" sz="1200" err="1"/>
+              <a:rPr lang="pt-BR" sz="1000" dirty="0" err="1"/>
               <a:t>Silhouette</a:t>
             </a:r>
             <a:r>
-              <a:rPr lang="pt-BR" sz="1200"/>
+              <a:rPr lang="pt-BR" sz="1000" dirty="0"/>
               <a:t>);</a:t>
             </a:r>
           </a:p>
@@ -17251,20 +16223,20 @@
               <a:buNone/>
             </a:pPr>
             <a:r>
-              <a:rPr lang="pt-BR" sz="1200"/>
+              <a:rPr lang="pt-BR" sz="1000" dirty="0"/>
               <a:t>4- Um novo arquivo </a:t>
             </a:r>
             <a:r>
-              <a:rPr lang="pt-BR" sz="1200" err="1"/>
+              <a:rPr lang="pt-BR" sz="1000" dirty="0" err="1"/>
               <a:t>csv</a:t>
             </a:r>
             <a:r>
-              <a:rPr lang="pt-BR" sz="1200"/>
+              <a:rPr lang="pt-BR" sz="1000" dirty="0"/>
               <a:t> foi gerado para utilização no treinamento do classificador;</a:t>
             </a:r>
           </a:p>
           <a:p>
-            <a:endParaRPr lang="pt-BR" sz="1400"/>
+            <a:endParaRPr lang="pt-BR" sz="1400" dirty="0"/>
           </a:p>
         </p:txBody>
       </p:sp>
@@ -17417,6 +16389,13 @@
   <p:clrMapOvr>
     <a:masterClrMapping/>
   </p:clrMapOvr>
+  <p:timing>
+    <p:tnLst>
+      <p:par>
+        <p:cTn id="1" dur="indefinite" restart="never" nodeType="tmRoot"/>
+      </p:par>
+    </p:tnLst>
+  </p:timing>
 </p:sld>
 </file>
 
@@ -17500,18 +16479,45 @@
                 </a:solidFill>
                 <a:effectLst/>
               </a:rPr>
-              <a:t>Utilizamos o mecanismos de testes a partir dos clientes já conhecidos onde vemos a performance de classificação de </a:t>
+              <a:t>Utilizamos o mecanismos de testes a partir dos clientes já conhecidos onde </a:t>
             </a:r>
             <a:r>
-              <a:rPr lang="pt-BR" sz="1600" dirty="0">
+              <a:rPr lang="pt-BR" sz="1600" b="0" i="0" dirty="0" smtClean="0">
+                <a:solidFill>
+                  <a:srgbClr val="000000"/>
+                </a:solidFill>
+                <a:effectLst/>
+              </a:rPr>
+              <a:t>chegamos a uma </a:t>
+            </a:r>
+            <a:r>
+              <a:rPr lang="pt-BR" sz="1600" b="0" i="0" dirty="0">
+                <a:solidFill>
+                  <a:srgbClr val="000000"/>
+                </a:solidFill>
+                <a:effectLst/>
+              </a:rPr>
+              <a:t>performance de classificação </a:t>
+            </a:r>
+            <a:r>
+              <a:rPr lang="pt-BR" sz="1600" b="0" i="0" dirty="0" smtClean="0">
+                <a:solidFill>
+                  <a:srgbClr val="000000"/>
+                </a:solidFill>
+                <a:effectLst/>
+              </a:rPr>
+              <a:t>superior a </a:t>
+            </a:r>
+            <a:r>
+              <a:rPr lang="pt-BR" sz="1600" dirty="0" smtClean="0">
                 <a:solidFill>
                   <a:srgbClr val="000000"/>
                 </a:solidFill>
               </a:rPr>
-              <a:t>99,5</a:t>
+              <a:t>99</a:t>
             </a:r>
             <a:r>
-              <a:rPr lang="pt-BR" sz="1600" b="0" i="0" dirty="0">
+              <a:rPr lang="pt-BR" sz="1600" b="0" i="0" dirty="0" smtClean="0">
                 <a:solidFill>
                   <a:srgbClr val="000000"/>
                 </a:solidFill>
@@ -17661,31 +16667,31 @@
           <a:lstStyle/>
           <a:p>
             <a:r>
-              <a:rPr lang="pt-BR" sz="1600" b="1"/>
+              <a:rPr lang="pt-BR" sz="1600" b="1" dirty="0"/>
               <a:t>Teste do Classificador utilizando dados Reais</a:t>
             </a:r>
           </a:p>
           <a:p>
             <a:r>
-              <a:rPr lang="pt-BR" sz="1600"/>
+              <a:rPr lang="pt-BR" sz="1600" dirty="0"/>
               <a:t>Buscamos um arquivo da CVM, com dados de resultado de empresas abertas do ano de 2016.</a:t>
             </a:r>
           </a:p>
           <a:p>
-            <a:endParaRPr lang="pt-BR" sz="1600"/>
+            <a:endParaRPr lang="pt-BR" sz="1600" dirty="0"/>
           </a:p>
           <a:p>
             <a:r>
-              <a:rPr lang="pt-BR" sz="1600"/>
+              <a:rPr lang="pt-BR" sz="1600" dirty="0"/>
               <a:t>A partir destes dados, efetuamos a preparação para aplicação do modelo, normalizando o faturamento e margem para período mensal.</a:t>
             </a:r>
           </a:p>
           <a:p>
-            <a:endParaRPr lang="pt-BR" sz="1600"/>
+            <a:endParaRPr lang="pt-BR" sz="1600" dirty="0"/>
           </a:p>
           <a:p>
             <a:r>
-              <a:rPr lang="pt-BR" sz="1600"/>
+              <a:rPr lang="pt-BR" sz="1600" dirty="0"/>
               <a:t>Como um modelo de classificação trabalha com situações previamente conhecidas, eliminamos empresas com faturamento acima dos conhecidos através da divisão por uma constante aleatória.</a:t>
             </a:r>
           </a:p>
@@ -17761,6 +16767,13 @@
   <p:clrMapOvr>
     <a:masterClrMapping/>
   </p:clrMapOvr>
+  <p:timing>
+    <p:tnLst>
+      <p:par>
+        <p:cTn id="1" dur="indefinite" restart="never" nodeType="tmRoot"/>
+      </p:par>
+    </p:tnLst>
+  </p:timing>
 </p:sld>
 </file>
 
@@ -17803,7 +16816,7 @@
           <a:lstStyle/>
           <a:p>
             <a:r>
-              <a:rPr lang="pt-BR"/>
+              <a:rPr lang="pt-BR" dirty="0"/>
               <a:t>Processo</a:t>
             </a:r>
           </a:p>
@@ -18156,245 +17169,17 @@
   <p:clrMapOvr>
     <a:masterClrMapping/>
   </p:clrMapOvr>
+  <p:timing>
+    <p:tnLst>
+      <p:par>
+        <p:cTn id="1" dur="indefinite" restart="never" nodeType="tmRoot"/>
+      </p:par>
+    </p:tnLst>
+  </p:timing>
 </p:sld>
 </file>
 
 <file path=ppt/slides/slide8.xml><?xml version="1.0" encoding="utf-8"?>
-<p:sld xmlns:a="http://schemas.openxmlformats.org/drawingml/2006/main" xmlns:r="http://schemas.openxmlformats.org/officeDocument/2006/relationships" xmlns:p="http://schemas.openxmlformats.org/presentationml/2006/main" show="0">
-  <p:cSld>
-    <p:spTree>
-      <p:nvGrpSpPr>
-        <p:cNvPr id="1" name=""/>
-        <p:cNvGrpSpPr/>
-        <p:nvPr/>
-      </p:nvGrpSpPr>
-      <p:grpSpPr>
-        <a:xfrm>
-          <a:off x="0" y="0"/>
-          <a:ext cx="0" cy="0"/>
-          <a:chOff x="0" y="0"/>
-          <a:chExt cx="0" cy="0"/>
-        </a:xfrm>
-      </p:grpSpPr>
-      <p:sp>
-        <p:nvSpPr>
-          <p:cNvPr id="2" name="Título 1">
-            <a:extLst>
-              <a:ext uri="{FF2B5EF4-FFF2-40B4-BE49-F238E27FC236}">
-                <a16:creationId xmlns:a16="http://schemas.microsoft.com/office/drawing/2014/main" id="{0250E1AC-7D99-4C3D-8F1E-B44E9BD1DF1B}"/>
-              </a:ext>
-            </a:extLst>
-          </p:cNvPr>
-          <p:cNvSpPr>
-            <a:spLocks noGrp="1"/>
-          </p:cNvSpPr>
-          <p:nvPr>
-            <p:ph type="title"/>
-          </p:nvPr>
-        </p:nvSpPr>
-        <p:spPr/>
-        <p:txBody>
-          <a:bodyPr/>
-          <a:lstStyle/>
-          <a:p>
-            <a:r>
-              <a:rPr lang="pt-BR" dirty="0"/>
-              <a:t>Processo</a:t>
-            </a:r>
-          </a:p>
-        </p:txBody>
-      </p:sp>
-      <p:sp>
-        <p:nvSpPr>
-          <p:cNvPr id="4" name="CaixaDeTexto 3">
-            <a:extLst>
-              <a:ext uri="{FF2B5EF4-FFF2-40B4-BE49-F238E27FC236}">
-                <a16:creationId xmlns:a16="http://schemas.microsoft.com/office/drawing/2014/main" id="{24D3E4E3-4FFB-453C-8EE3-C4E1CF4B6852}"/>
-              </a:ext>
-            </a:extLst>
-          </p:cNvPr>
-          <p:cNvSpPr txBox="1"/>
-          <p:nvPr/>
-        </p:nvSpPr>
-        <p:spPr>
-          <a:xfrm>
-            <a:off x="4267207" y="675025"/>
-            <a:ext cx="7460968" cy="1323439"/>
-          </a:xfrm>
-          <a:prstGeom prst="rect">
-            <a:avLst/>
-          </a:prstGeom>
-          <a:solidFill>
-            <a:schemeClr val="accent1">
-              <a:lumMod val="20000"/>
-              <a:lumOff val="80000"/>
-            </a:schemeClr>
-          </a:solidFill>
-        </p:spPr>
-        <p:style>
-          <a:lnRef idx="0">
-            <a:schemeClr val="accent2"/>
-          </a:lnRef>
-          <a:fillRef idx="3">
-            <a:schemeClr val="accent2"/>
-          </a:fillRef>
-          <a:effectRef idx="3">
-            <a:schemeClr val="accent2"/>
-          </a:effectRef>
-          <a:fontRef idx="minor">
-            <a:schemeClr val="lt1"/>
-          </a:fontRef>
-        </p:style>
-        <p:txBody>
-          <a:bodyPr wrap="square" rtlCol="0">
-            <a:spAutoFit/>
-          </a:bodyPr>
-          <a:lstStyle/>
-          <a:p>
-            <a:r>
-              <a:rPr lang="pt-BR" sz="2000" dirty="0" err="1">
-                <a:solidFill>
-                  <a:schemeClr val="tx1"/>
-                </a:solidFill>
-              </a:rPr>
-              <a:t>Regressor</a:t>
-            </a:r>
-            <a:r>
-              <a:rPr lang="pt-BR" sz="2000" dirty="0">
-                <a:solidFill>
-                  <a:schemeClr val="tx1"/>
-                </a:solidFill>
-              </a:rPr>
-              <a:t>: O objetivo desta classe é utilizar métodos de regressão com o propósito de apoiar os analistas de concessão de crédito  com uma sugestão de valor a ser aprovado</a:t>
-            </a:r>
-          </a:p>
-        </p:txBody>
-      </p:sp>
-      <p:sp>
-        <p:nvSpPr>
-          <p:cNvPr id="5" name="Retângulo 4">
-            <a:extLst>
-              <a:ext uri="{FF2B5EF4-FFF2-40B4-BE49-F238E27FC236}">
-                <a16:creationId xmlns:a16="http://schemas.microsoft.com/office/drawing/2014/main" id="{3F08AF0F-953E-4E7B-9832-0A6B9ADE5976}"/>
-              </a:ext>
-            </a:extLst>
-          </p:cNvPr>
-          <p:cNvSpPr/>
-          <p:nvPr/>
-        </p:nvSpPr>
-        <p:spPr>
-          <a:xfrm>
-            <a:off x="3694614" y="541597"/>
-            <a:ext cx="572593" cy="923330"/>
-          </a:xfrm>
-          <a:prstGeom prst="rect">
-            <a:avLst/>
-          </a:prstGeom>
-          <a:noFill/>
-        </p:spPr>
-        <p:txBody>
-          <a:bodyPr wrap="none" lIns="91440" tIns="45720" rIns="91440" bIns="45720">
-            <a:spAutoFit/>
-          </a:bodyPr>
-          <a:lstStyle/>
-          <a:p>
-            <a:pPr algn="ctr"/>
-            <a:r>
-              <a:rPr lang="pt-BR" sz="5400" b="1" cap="none" spc="0">
-                <a:ln w="6600">
-                  <a:solidFill>
-                    <a:schemeClr val="accent2"/>
-                  </a:solidFill>
-                  <a:prstDash val="solid"/>
-                </a:ln>
-                <a:solidFill>
-                  <a:srgbClr val="FFFFFF"/>
-                </a:solidFill>
-                <a:effectLst>
-                  <a:outerShdw dist="38100" dir="2700000" algn="tl" rotWithShape="0">
-                    <a:schemeClr val="accent2"/>
-                  </a:outerShdw>
-                </a:effectLst>
-              </a:rPr>
-              <a:t>3</a:t>
-            </a:r>
-          </a:p>
-        </p:txBody>
-      </p:sp>
-      <p:pic>
-        <p:nvPicPr>
-          <p:cNvPr id="11" name="Imagem 10">
-            <a:extLst>
-              <a:ext uri="{FF2B5EF4-FFF2-40B4-BE49-F238E27FC236}">
-                <a16:creationId xmlns:a16="http://schemas.microsoft.com/office/drawing/2014/main" id="{04290141-0F56-455F-873E-FAAA4BABD21E}"/>
-              </a:ext>
-            </a:extLst>
-          </p:cNvPr>
-          <p:cNvPicPr>
-            <a:picLocks noChangeAspect="1"/>
-          </p:cNvPicPr>
-          <p:nvPr/>
-        </p:nvPicPr>
-        <p:blipFill>
-          <a:blip r:embed="rId2"/>
-          <a:stretch>
-            <a:fillRect/>
-          </a:stretch>
-        </p:blipFill>
-        <p:spPr>
-          <a:xfrm>
-            <a:off x="193916" y="2769704"/>
-            <a:ext cx="6273523" cy="4110487"/>
-          </a:xfrm>
-          <a:prstGeom prst="rect">
-            <a:avLst/>
-          </a:prstGeom>
-        </p:spPr>
-      </p:pic>
-      <p:pic>
-        <p:nvPicPr>
-          <p:cNvPr id="12" name="Imagem 11">
-            <a:extLst>
-              <a:ext uri="{FF2B5EF4-FFF2-40B4-BE49-F238E27FC236}">
-                <a16:creationId xmlns:a16="http://schemas.microsoft.com/office/drawing/2014/main" id="{88BA884B-9EF2-4985-9BC1-12B988F3AF2C}"/>
-              </a:ext>
-            </a:extLst>
-          </p:cNvPr>
-          <p:cNvPicPr>
-            <a:picLocks noChangeAspect="1"/>
-          </p:cNvPicPr>
-          <p:nvPr/>
-        </p:nvPicPr>
-        <p:blipFill>
-          <a:blip r:embed="rId3"/>
-          <a:stretch>
-            <a:fillRect/>
-          </a:stretch>
-        </p:blipFill>
-        <p:spPr>
-          <a:xfrm>
-            <a:off x="6467439" y="2769704"/>
-            <a:ext cx="5285496" cy="2906395"/>
-          </a:xfrm>
-          <a:prstGeom prst="rect">
-            <a:avLst/>
-          </a:prstGeom>
-        </p:spPr>
-      </p:pic>
-    </p:spTree>
-    <p:extLst>
-      <p:ext uri="{BB962C8B-B14F-4D97-AF65-F5344CB8AC3E}">
-        <p14:creationId xmlns:p14="http://schemas.microsoft.com/office/powerpoint/2010/main" val="529662876"/>
-      </p:ext>
-    </p:extLst>
-  </p:cSld>
-  <p:clrMapOvr>
-    <a:masterClrMapping/>
-  </p:clrMapOvr>
-</p:sld>
-</file>
-
-<file path=ppt/slides/slide9.xml><?xml version="1.0" encoding="utf-8"?>
 <p:sld xmlns:a="http://schemas.openxmlformats.org/drawingml/2006/main" xmlns:r="http://schemas.openxmlformats.org/officeDocument/2006/relationships" xmlns:p="http://schemas.openxmlformats.org/presentationml/2006/main">
   <p:cSld>
     <p:spTree>
@@ -18462,68 +17247,25 @@
                 <a:ea typeface="+mn-lt"/>
                 <a:cs typeface="+mn-lt"/>
               </a:rPr>
-              <a:t>Foram utilizadas redes neurais baseadas em LSTM  para capturar tendencias de curto e longo prazo</a:t>
+              <a:t>Foram utilizadas redes neurais baseadas em LSTM  para capturar tendencias de curto </a:t>
             </a:r>
+            <a:r>
+              <a:rPr lang="pt-BR" sz="1600" dirty="0" smtClean="0">
+                <a:ea typeface="+mn-lt"/>
+                <a:cs typeface="+mn-lt"/>
+              </a:rPr>
+              <a:t>prazo</a:t>
+            </a:r>
+            <a:endParaRPr lang="pt-BR" sz="1600" dirty="0">
+              <a:ea typeface="+mn-lt"/>
+              <a:cs typeface="+mn-lt"/>
+            </a:endParaRPr>
           </a:p>
           <a:p>
             <a:endParaRPr lang="pt-BR" dirty="0"/>
           </a:p>
           <a:p>
             <a:endParaRPr lang="pt-BR" dirty="0"/>
-          </a:p>
-        </p:txBody>
-      </p:sp>
-      <p:sp>
-        <p:nvSpPr>
-          <p:cNvPr id="8" name="Título 1">
-            <a:extLst>
-              <a:ext uri="{FF2B5EF4-FFF2-40B4-BE49-F238E27FC236}">
-                <a16:creationId xmlns:a16="http://schemas.microsoft.com/office/drawing/2014/main" id="{03025FCF-4031-42C1-B161-8909406DE047}"/>
-              </a:ext>
-            </a:extLst>
-          </p:cNvPr>
-          <p:cNvSpPr txBox="1">
-            <a:spLocks/>
-          </p:cNvSpPr>
-          <p:nvPr/>
-        </p:nvSpPr>
-        <p:spPr>
-          <a:xfrm>
-            <a:off x="990600" y="517525"/>
-            <a:ext cx="10515600" cy="1325563"/>
-          </a:xfrm>
-          <a:prstGeom prst="rect">
-            <a:avLst/>
-          </a:prstGeom>
-        </p:spPr>
-        <p:txBody>
-          <a:bodyPr vert="horz" lIns="91440" tIns="45720" rIns="91440" bIns="45720" rtlCol="0" anchor="ctr">
-            <a:normAutofit/>
-          </a:bodyPr>
-          <a:lstStyle>
-            <a:lvl1pPr algn="l" defTabSz="914400" rtl="0" eaLnBrk="1" latinLnBrk="0" hangingPunct="1">
-              <a:lnSpc>
-                <a:spcPct val="90000"/>
-              </a:lnSpc>
-              <a:spcBef>
-                <a:spcPct val="0"/>
-              </a:spcBef>
-              <a:buNone/>
-              <a:defRPr sz="4000" i="0" kern="1200">
-                <a:solidFill>
-                  <a:schemeClr val="tx1"/>
-                </a:solidFill>
-                <a:latin typeface="+mj-lt"/>
-                <a:ea typeface="+mj-ea"/>
-                <a:cs typeface="+mj-cs"/>
-              </a:defRPr>
-            </a:lvl1pPr>
-          </a:lstStyle>
-          <a:p>
-            <a:r>
-              <a:rPr lang="pt-BR"/>
-              <a:t>Processo</a:t>
-            </a:r>
           </a:p>
         </p:txBody>
       </p:sp>
@@ -18687,6 +17429,39 @@
           </a:prstGeom>
         </p:spPr>
       </p:pic>
+      <p:sp>
+        <p:nvSpPr>
+          <p:cNvPr id="7" name="Título 1">
+            <a:extLst>
+              <a:ext uri="{FF2B5EF4-FFF2-40B4-BE49-F238E27FC236}">
+                <a16:creationId xmlns:a16="http://schemas.microsoft.com/office/drawing/2014/main" id="{0250E1AC-7D99-4C3D-8F1E-B44E9BD1DF1B}"/>
+              </a:ext>
+            </a:extLst>
+          </p:cNvPr>
+          <p:cNvSpPr>
+            <a:spLocks noGrp="1"/>
+          </p:cNvSpPr>
+          <p:nvPr>
+            <p:ph type="title"/>
+          </p:nvPr>
+        </p:nvSpPr>
+        <p:spPr>
+          <a:xfrm>
+            <a:off x="838200" y="365125"/>
+            <a:ext cx="10515600" cy="1325563"/>
+          </a:xfrm>
+        </p:spPr>
+        <p:txBody>
+          <a:bodyPr/>
+          <a:lstStyle/>
+          <a:p>
+            <a:r>
+              <a:rPr lang="pt-BR" dirty="0"/>
+              <a:t>Processo</a:t>
+            </a:r>
+          </a:p>
+        </p:txBody>
+      </p:sp>
     </p:spTree>
     <p:extLst>
       <p:ext uri="{BB962C8B-B14F-4D97-AF65-F5344CB8AC3E}">
@@ -18697,6 +17472,138 @@
   <p:clrMapOvr>
     <a:masterClrMapping/>
   </p:clrMapOvr>
+  <p:timing>
+    <p:tnLst>
+      <p:par>
+        <p:cTn id="1" dur="indefinite" restart="never" nodeType="tmRoot"/>
+      </p:par>
+    </p:tnLst>
+  </p:timing>
+</p:sld>
+</file>
+
+<file path=ppt/slides/slide9.xml><?xml version="1.0" encoding="utf-8"?>
+<p:sld xmlns:a="http://schemas.openxmlformats.org/drawingml/2006/main" xmlns:r="http://schemas.openxmlformats.org/officeDocument/2006/relationships" xmlns:p="http://schemas.openxmlformats.org/presentationml/2006/main">
+  <p:cSld>
+    <p:spTree>
+      <p:nvGrpSpPr>
+        <p:cNvPr id="1" name=""/>
+        <p:cNvGrpSpPr/>
+        <p:nvPr/>
+      </p:nvGrpSpPr>
+      <p:grpSpPr>
+        <a:xfrm>
+          <a:off x="0" y="0"/>
+          <a:ext cx="0" cy="0"/>
+          <a:chOff x="0" y="0"/>
+          <a:chExt cx="0" cy="0"/>
+        </a:xfrm>
+      </p:grpSpPr>
+      <p:sp>
+        <p:nvSpPr>
+          <p:cNvPr id="2" name="Título 1">
+            <a:extLst>
+              <a:ext uri="{FF2B5EF4-FFF2-40B4-BE49-F238E27FC236}">
+                <a16:creationId xmlns:a16="http://schemas.microsoft.com/office/drawing/2014/main" id="{CD663C5E-8DD2-4895-BFC9-8FA02DF7EC8E}"/>
+              </a:ext>
+            </a:extLst>
+          </p:cNvPr>
+          <p:cNvSpPr>
+            <a:spLocks noGrp="1"/>
+          </p:cNvSpPr>
+          <p:nvPr>
+            <p:ph type="title"/>
+          </p:nvPr>
+        </p:nvSpPr>
+        <p:spPr/>
+        <p:txBody>
+          <a:bodyPr/>
+          <a:lstStyle/>
+          <a:p>
+            <a:r>
+              <a:rPr lang="pt-BR" dirty="0"/>
+              <a:t>Benefícios esperados</a:t>
+            </a:r>
+          </a:p>
+        </p:txBody>
+      </p:sp>
+      <p:sp>
+        <p:nvSpPr>
+          <p:cNvPr id="3" name="Espaço Reservado para Conteúdo 2">
+            <a:extLst>
+              <a:ext uri="{FF2B5EF4-FFF2-40B4-BE49-F238E27FC236}">
+                <a16:creationId xmlns:a16="http://schemas.microsoft.com/office/drawing/2014/main" id="{2CA4C7CB-53AD-4A3B-8586-A0563C6DC7D0}"/>
+              </a:ext>
+            </a:extLst>
+          </p:cNvPr>
+          <p:cNvSpPr>
+            <a:spLocks noGrp="1"/>
+          </p:cNvSpPr>
+          <p:nvPr>
+            <p:ph idx="1"/>
+          </p:nvPr>
+        </p:nvSpPr>
+        <p:spPr/>
+        <p:txBody>
+          <a:bodyPr>
+            <a:normAutofit/>
+          </a:bodyPr>
+          <a:lstStyle/>
+          <a:p>
+            <a:r>
+              <a:rPr lang="pt-BR" dirty="0"/>
+              <a:t>Redução do Lead time da esteira de aprovação de crédito, pois os analistas trabalharão propostas dos segmentos que melhor conhecem e terão o apoio da AI sugerindo um valor de crédito a ser concedido.</a:t>
+            </a:r>
+          </a:p>
+          <a:p>
+            <a:r>
+              <a:rPr lang="pt-BR" dirty="0"/>
+              <a:t>Iniciar uma trilha de utilização de dados para melhoria de processos e tomada de decisão</a:t>
+            </a:r>
+          </a:p>
+          <a:p>
+            <a:r>
+              <a:rPr lang="pt-BR" dirty="0"/>
+              <a:t>Facilitar planejamento financeiro utilizando o </a:t>
+            </a:r>
+            <a:r>
+              <a:rPr lang="pt-BR" dirty="0" err="1"/>
+              <a:t>forecast</a:t>
+            </a:r>
+            <a:r>
+              <a:rPr lang="pt-BR" dirty="0"/>
+              <a:t> de concessão de </a:t>
+            </a:r>
+            <a:r>
+              <a:rPr lang="pt-BR" dirty="0" smtClean="0"/>
+              <a:t>crédito</a:t>
+            </a:r>
+          </a:p>
+          <a:p>
+            <a:pPr marL="0" indent="0">
+              <a:buNone/>
+            </a:pPr>
+            <a:endParaRPr lang="pt-BR" dirty="0"/>
+          </a:p>
+        </p:txBody>
+      </p:sp>
+    </p:spTree>
+    <p:extLst>
+      <p:ext uri="{BB962C8B-B14F-4D97-AF65-F5344CB8AC3E}">
+        <p14:creationId xmlns:p14="http://schemas.microsoft.com/office/powerpoint/2010/main" val="1748764784"/>
+      </p:ext>
+    </p:extLst>
+  </p:cSld>
+  <p:clrMapOvr>
+    <a:masterClrMapping/>
+  </p:clrMapOvr>
+  <p:timing>
+    <p:tnLst>
+      <p:par>
+        <p:cTn id="1" dur="indefinite" restart="never" nodeType="tmRoot"/>
+      </p:par>
+    </p:tnLst>
+  </p:timing>
 </p:sld>
 </file>
 

</xml_diff>